<commit_message>
big update for PCGPA
</commit_message>
<xml_diff>
--- a/12-14-2023/memo.pptx
+++ b/12-14-2023/memo.pptx
@@ -5,7 +5,13 @@
     <p:sldMasterId id="2147483648" r:id="rId1"/>
   </p:sldMasterIdLst>
   <p:sldIdLst>
-    <p:sldId id="256" r:id="rId2"/>
+    <p:sldId id="257" r:id="rId2"/>
+    <p:sldId id="258" r:id="rId3"/>
+    <p:sldId id="259" r:id="rId4"/>
+    <p:sldId id="260" r:id="rId5"/>
+    <p:sldId id="261" r:id="rId6"/>
+    <p:sldId id="262" r:id="rId7"/>
+    <p:sldId id="263" r:id="rId8"/>
   </p:sldIdLst>
   <p:sldSz cx="12192000" cy="6858000"/>
   <p:notesSz cx="6858000" cy="9144000"/>
@@ -104,6 +110,11 @@
       </a:defRPr>
     </a:lvl9pPr>
   </p:defaultTextStyle>
+  <p:extLst>
+    <p:ext uri="{EFAFB233-063F-42B5-8137-9DF3F51BA10A}">
+      <p15:sldGuideLst xmlns:p15="http://schemas.microsoft.com/office/powerpoint/2012/main"/>
+    </p:ext>
+  </p:extLst>
 </p:presentation>
 </file>
 
@@ -254,7 +265,7 @@
           <a:p>
             <a:fld id="{0D9B7AB2-72BD-4B49-96B5-BC046C9DB621}" type="datetimeFigureOut">
               <a:rPr lang="en-US" smtClean="0"/>
-              <a:t>12/14/23</a:t>
+              <a:t>12/16/23</a:t>
             </a:fld>
             <a:endParaRPr lang="en-US"/>
           </a:p>
@@ -452,7 +463,7 @@
           <a:p>
             <a:fld id="{0D9B7AB2-72BD-4B49-96B5-BC046C9DB621}" type="datetimeFigureOut">
               <a:rPr lang="en-US" smtClean="0"/>
-              <a:t>12/14/23</a:t>
+              <a:t>12/16/23</a:t>
             </a:fld>
             <a:endParaRPr lang="en-US"/>
           </a:p>
@@ -660,7 +671,7 @@
           <a:p>
             <a:fld id="{0D9B7AB2-72BD-4B49-96B5-BC046C9DB621}" type="datetimeFigureOut">
               <a:rPr lang="en-US" smtClean="0"/>
-              <a:t>12/14/23</a:t>
+              <a:t>12/16/23</a:t>
             </a:fld>
             <a:endParaRPr lang="en-US"/>
           </a:p>
@@ -858,7 +869,7 @@
           <a:p>
             <a:fld id="{0D9B7AB2-72BD-4B49-96B5-BC046C9DB621}" type="datetimeFigureOut">
               <a:rPr lang="en-US" smtClean="0"/>
-              <a:t>12/14/23</a:t>
+              <a:t>12/16/23</a:t>
             </a:fld>
             <a:endParaRPr lang="en-US"/>
           </a:p>
@@ -1133,7 +1144,7 @@
           <a:p>
             <a:fld id="{0D9B7AB2-72BD-4B49-96B5-BC046C9DB621}" type="datetimeFigureOut">
               <a:rPr lang="en-US" smtClean="0"/>
-              <a:t>12/14/23</a:t>
+              <a:t>12/16/23</a:t>
             </a:fld>
             <a:endParaRPr lang="en-US"/>
           </a:p>
@@ -1398,7 +1409,7 @@
           <a:p>
             <a:fld id="{0D9B7AB2-72BD-4B49-96B5-BC046C9DB621}" type="datetimeFigureOut">
               <a:rPr lang="en-US" smtClean="0"/>
-              <a:t>12/14/23</a:t>
+              <a:t>12/16/23</a:t>
             </a:fld>
             <a:endParaRPr lang="en-US"/>
           </a:p>
@@ -1810,7 +1821,7 @@
           <a:p>
             <a:fld id="{0D9B7AB2-72BD-4B49-96B5-BC046C9DB621}" type="datetimeFigureOut">
               <a:rPr lang="en-US" smtClean="0"/>
-              <a:t>12/14/23</a:t>
+              <a:t>12/16/23</a:t>
             </a:fld>
             <a:endParaRPr lang="en-US"/>
           </a:p>
@@ -1951,7 +1962,7 @@
           <a:p>
             <a:fld id="{0D9B7AB2-72BD-4B49-96B5-BC046C9DB621}" type="datetimeFigureOut">
               <a:rPr lang="en-US" smtClean="0"/>
-              <a:t>12/14/23</a:t>
+              <a:t>12/16/23</a:t>
             </a:fld>
             <a:endParaRPr lang="en-US"/>
           </a:p>
@@ -2064,7 +2075,7 @@
           <a:p>
             <a:fld id="{0D9B7AB2-72BD-4B49-96B5-BC046C9DB621}" type="datetimeFigureOut">
               <a:rPr lang="en-US" smtClean="0"/>
-              <a:t>12/14/23</a:t>
+              <a:t>12/16/23</a:t>
             </a:fld>
             <a:endParaRPr lang="en-US"/>
           </a:p>
@@ -2375,7 +2386,7 @@
           <a:p>
             <a:fld id="{0D9B7AB2-72BD-4B49-96B5-BC046C9DB621}" type="datetimeFigureOut">
               <a:rPr lang="en-US" smtClean="0"/>
-              <a:t>12/14/23</a:t>
+              <a:t>12/16/23</a:t>
             </a:fld>
             <a:endParaRPr lang="en-US"/>
           </a:p>
@@ -2663,7 +2674,7 @@
           <a:p>
             <a:fld id="{0D9B7AB2-72BD-4B49-96B5-BC046C9DB621}" type="datetimeFigureOut">
               <a:rPr lang="en-US" smtClean="0"/>
-              <a:t>12/14/23</a:t>
+              <a:t>12/16/23</a:t>
             </a:fld>
             <a:endParaRPr lang="en-US"/>
           </a:p>
@@ -2904,7 +2915,7 @@
           <a:p>
             <a:fld id="{0D9B7AB2-72BD-4B49-96B5-BC046C9DB621}" type="datetimeFigureOut">
               <a:rPr lang="en-US" smtClean="0"/>
-              <a:t>12/14/23</a:t>
+              <a:t>12/16/23</a:t>
             </a:fld>
             <a:endParaRPr lang="en-US"/>
           </a:p>
@@ -3414,7 +3425,842 @@
     </p:spTree>
     <p:extLst>
       <p:ext uri="{BB962C8B-B14F-4D97-AF65-F5344CB8AC3E}">
-        <p14:creationId xmlns:p14="http://schemas.microsoft.com/office/powerpoint/2010/main" val="3159470262"/>
+        <p14:creationId xmlns:p14="http://schemas.microsoft.com/office/powerpoint/2010/main" val="2523444575"/>
+      </p:ext>
+    </p:extLst>
+  </p:cSld>
+  <p:clrMapOvr>
+    <a:masterClrMapping/>
+  </p:clrMapOvr>
+</p:sld>
+</file>
+
+<file path=ppt/slides/slide2.xml><?xml version="1.0" encoding="utf-8"?>
+<p:sld xmlns:a="http://schemas.openxmlformats.org/drawingml/2006/main" xmlns:r="http://schemas.openxmlformats.org/officeDocument/2006/relationships" xmlns:p="http://schemas.openxmlformats.org/presentationml/2006/main">
+  <p:cSld>
+    <p:spTree>
+      <p:nvGrpSpPr>
+        <p:cNvPr id="1" name=""/>
+        <p:cNvGrpSpPr/>
+        <p:nvPr/>
+      </p:nvGrpSpPr>
+      <p:grpSpPr>
+        <a:xfrm>
+          <a:off x="0" y="0"/>
+          <a:ext cx="0" cy="0"/>
+          <a:chOff x="0" y="0"/>
+          <a:chExt cx="0" cy="0"/>
+        </a:xfrm>
+      </p:grpSpPr>
+      <p:pic>
+        <p:nvPicPr>
+          <p:cNvPr id="10" name="Picture 9">
+            <a:extLst>
+              <a:ext uri="{FF2B5EF4-FFF2-40B4-BE49-F238E27FC236}">
+                <a16:creationId xmlns:a16="http://schemas.microsoft.com/office/drawing/2014/main" id="{DC7BB15E-BF9A-3364-6DF3-BC80D4B871D2}"/>
+              </a:ext>
+            </a:extLst>
+          </p:cNvPr>
+          <p:cNvPicPr>
+            <a:picLocks noChangeAspect="1"/>
+          </p:cNvPicPr>
+          <p:nvPr/>
+        </p:nvPicPr>
+        <p:blipFill>
+          <a:blip r:embed="rId2"/>
+          <a:stretch>
+            <a:fillRect/>
+          </a:stretch>
+        </p:blipFill>
+        <p:spPr>
+          <a:xfrm>
+            <a:off x="398754" y="914936"/>
+            <a:ext cx="3898038" cy="1528642"/>
+          </a:xfrm>
+          <a:prstGeom prst="rect">
+            <a:avLst/>
+          </a:prstGeom>
+        </p:spPr>
+      </p:pic>
+      <p:pic>
+        <p:nvPicPr>
+          <p:cNvPr id="11" name="Picture 10">
+            <a:extLst>
+              <a:ext uri="{FF2B5EF4-FFF2-40B4-BE49-F238E27FC236}">
+                <a16:creationId xmlns:a16="http://schemas.microsoft.com/office/drawing/2014/main" id="{1E50DDB8-AD18-D206-98E2-7F1BC5EAE86C}"/>
+              </a:ext>
+            </a:extLst>
+          </p:cNvPr>
+          <p:cNvPicPr>
+            <a:picLocks noChangeAspect="1"/>
+          </p:cNvPicPr>
+          <p:nvPr/>
+        </p:nvPicPr>
+        <p:blipFill>
+          <a:blip r:embed="rId3"/>
+          <a:stretch>
+            <a:fillRect/>
+          </a:stretch>
+        </p:blipFill>
+        <p:spPr>
+          <a:xfrm>
+            <a:off x="0" y="2698812"/>
+            <a:ext cx="6807895" cy="3542480"/>
+          </a:xfrm>
+          <a:prstGeom prst="rect">
+            <a:avLst/>
+          </a:prstGeom>
+        </p:spPr>
+      </p:pic>
+      <p:pic>
+        <p:nvPicPr>
+          <p:cNvPr id="13" name="Picture 12">
+            <a:extLst>
+              <a:ext uri="{FF2B5EF4-FFF2-40B4-BE49-F238E27FC236}">
+                <a16:creationId xmlns:a16="http://schemas.microsoft.com/office/drawing/2014/main" id="{B2777675-319E-E377-4C4D-0B0423345B53}"/>
+              </a:ext>
+            </a:extLst>
+          </p:cNvPr>
+          <p:cNvPicPr>
+            <a:picLocks noChangeAspect="1"/>
+          </p:cNvPicPr>
+          <p:nvPr/>
+        </p:nvPicPr>
+        <p:blipFill>
+          <a:blip r:embed="rId4"/>
+          <a:stretch>
+            <a:fillRect/>
+          </a:stretch>
+        </p:blipFill>
+        <p:spPr>
+          <a:xfrm>
+            <a:off x="5912528" y="85291"/>
+            <a:ext cx="6360110" cy="2842507"/>
+          </a:xfrm>
+          <a:prstGeom prst="rect">
+            <a:avLst/>
+          </a:prstGeom>
+        </p:spPr>
+      </p:pic>
+      <p:sp>
+        <p:nvSpPr>
+          <p:cNvPr id="16" name="TextBox 15">
+            <a:extLst>
+              <a:ext uri="{FF2B5EF4-FFF2-40B4-BE49-F238E27FC236}">
+                <a16:creationId xmlns:a16="http://schemas.microsoft.com/office/drawing/2014/main" id="{572C39FD-9D46-69A7-D395-D674EF434522}"/>
+              </a:ext>
+            </a:extLst>
+          </p:cNvPr>
+          <p:cNvSpPr txBox="1"/>
+          <p:nvPr/>
+        </p:nvSpPr>
+        <p:spPr>
+          <a:xfrm>
+            <a:off x="7759083" y="3480047"/>
+            <a:ext cx="4092606" cy="1754326"/>
+          </a:xfrm>
+          <a:prstGeom prst="rect">
+            <a:avLst/>
+          </a:prstGeom>
+          <a:noFill/>
+        </p:spPr>
+        <p:txBody>
+          <a:bodyPr wrap="square" rtlCol="0">
+            <a:spAutoFit/>
+          </a:bodyPr>
+          <a:lstStyle/>
+          <a:p>
+            <a:r>
+              <a:rPr lang="en-US" dirty="0"/>
+              <a:t>Looking at the simulated FROG, the power method has issues with stability. Because it will always push the pulse always from its current value, even if just slightly. So, I went with a true principal projection, by using </a:t>
+            </a:r>
+            <a:r>
+              <a:rPr lang="en-US" dirty="0" err="1"/>
+              <a:t>jax.scipy.linalg.svd</a:t>
+            </a:r>
+            <a:endParaRPr lang="en-US" dirty="0"/>
+          </a:p>
+        </p:txBody>
+      </p:sp>
+    </p:spTree>
+    <p:extLst>
+      <p:ext uri="{BB962C8B-B14F-4D97-AF65-F5344CB8AC3E}">
+        <p14:creationId xmlns:p14="http://schemas.microsoft.com/office/powerpoint/2010/main" val="2501928132"/>
+      </p:ext>
+    </p:extLst>
+  </p:cSld>
+  <p:clrMapOvr>
+    <a:masterClrMapping/>
+  </p:clrMapOvr>
+</p:sld>
+</file>
+
+<file path=ppt/slides/slide3.xml><?xml version="1.0" encoding="utf-8"?>
+<p:sld xmlns:a="http://schemas.openxmlformats.org/drawingml/2006/main" xmlns:r="http://schemas.openxmlformats.org/officeDocument/2006/relationships" xmlns:p="http://schemas.openxmlformats.org/presentationml/2006/main">
+  <p:cSld>
+    <p:spTree>
+      <p:nvGrpSpPr>
+        <p:cNvPr id="1" name=""/>
+        <p:cNvGrpSpPr/>
+        <p:nvPr/>
+      </p:nvGrpSpPr>
+      <p:grpSpPr>
+        <a:xfrm>
+          <a:off x="0" y="0"/>
+          <a:ext cx="0" cy="0"/>
+          <a:chOff x="0" y="0"/>
+          <a:chExt cx="0" cy="0"/>
+        </a:xfrm>
+      </p:grpSpPr>
+      <p:sp>
+        <p:nvSpPr>
+          <p:cNvPr id="4" name="Title 3">
+            <a:extLst>
+              <a:ext uri="{FF2B5EF4-FFF2-40B4-BE49-F238E27FC236}">
+                <a16:creationId xmlns:a16="http://schemas.microsoft.com/office/drawing/2014/main" id="{BE8BFCF8-C5C6-58BD-AF66-2D658FDC20A4}"/>
+              </a:ext>
+            </a:extLst>
+          </p:cNvPr>
+          <p:cNvSpPr>
+            <a:spLocks noGrp="1"/>
+          </p:cNvSpPr>
+          <p:nvPr>
+            <p:ph type="title"/>
+          </p:nvPr>
+        </p:nvSpPr>
+        <p:spPr/>
+        <p:txBody>
+          <a:bodyPr/>
+          <a:lstStyle/>
+          <a:p>
+            <a:r>
+              <a:rPr lang="en-US" dirty="0"/>
+              <a:t>Setting v0 and bandwidth automatically</a:t>
+            </a:r>
+          </a:p>
+        </p:txBody>
+      </p:sp>
+      <p:sp>
+        <p:nvSpPr>
+          <p:cNvPr id="5" name="Text Placeholder 4">
+            <a:extLst>
+              <a:ext uri="{FF2B5EF4-FFF2-40B4-BE49-F238E27FC236}">
+                <a16:creationId xmlns:a16="http://schemas.microsoft.com/office/drawing/2014/main" id="{8C2CBE47-9BC7-868D-7B58-8BBEB8A6E3BF}"/>
+              </a:ext>
+            </a:extLst>
+          </p:cNvPr>
+          <p:cNvSpPr>
+            <a:spLocks noGrp="1"/>
+          </p:cNvSpPr>
+          <p:nvPr>
+            <p:ph type="body" idx="1"/>
+          </p:nvPr>
+        </p:nvSpPr>
+        <p:spPr/>
+        <p:txBody>
+          <a:bodyPr/>
+          <a:lstStyle/>
+          <a:p>
+            <a:endParaRPr lang="en-US"/>
+          </a:p>
+        </p:txBody>
+      </p:sp>
+    </p:spTree>
+    <p:extLst>
+      <p:ext uri="{BB962C8B-B14F-4D97-AF65-F5344CB8AC3E}">
+        <p14:creationId xmlns:p14="http://schemas.microsoft.com/office/powerpoint/2010/main" val="3085626271"/>
+      </p:ext>
+    </p:extLst>
+  </p:cSld>
+  <p:clrMapOvr>
+    <a:masterClrMapping/>
+  </p:clrMapOvr>
+</p:sld>
+</file>
+
+<file path=ppt/slides/slide4.xml><?xml version="1.0" encoding="utf-8"?>
+<p:sld xmlns:a="http://schemas.openxmlformats.org/drawingml/2006/main" xmlns:r="http://schemas.openxmlformats.org/officeDocument/2006/relationships" xmlns:p="http://schemas.openxmlformats.org/presentationml/2006/main">
+  <p:cSld>
+    <p:spTree>
+      <p:nvGrpSpPr>
+        <p:cNvPr id="1" name=""/>
+        <p:cNvGrpSpPr/>
+        <p:nvPr/>
+      </p:nvGrpSpPr>
+      <p:grpSpPr>
+        <a:xfrm>
+          <a:off x="0" y="0"/>
+          <a:ext cx="0" cy="0"/>
+          <a:chOff x="0" y="0"/>
+          <a:chExt cx="0" cy="0"/>
+        </a:xfrm>
+      </p:grpSpPr>
+      <p:pic>
+        <p:nvPicPr>
+          <p:cNvPr id="5" name="Picture 4">
+            <a:extLst>
+              <a:ext uri="{FF2B5EF4-FFF2-40B4-BE49-F238E27FC236}">
+                <a16:creationId xmlns:a16="http://schemas.microsoft.com/office/drawing/2014/main" id="{ABFE0B5B-B52A-5BAE-18CC-A24012FFF3FE}"/>
+              </a:ext>
+            </a:extLst>
+          </p:cNvPr>
+          <p:cNvPicPr>
+            <a:picLocks noChangeAspect="1"/>
+          </p:cNvPicPr>
+          <p:nvPr/>
+        </p:nvPicPr>
+        <p:blipFill>
+          <a:blip r:embed="rId2"/>
+          <a:stretch>
+            <a:fillRect/>
+          </a:stretch>
+        </p:blipFill>
+        <p:spPr>
+          <a:xfrm>
+            <a:off x="38353" y="3036030"/>
+            <a:ext cx="6648450" cy="3605938"/>
+          </a:xfrm>
+          <a:prstGeom prst="rect">
+            <a:avLst/>
+          </a:prstGeom>
+        </p:spPr>
+      </p:pic>
+      <p:pic>
+        <p:nvPicPr>
+          <p:cNvPr id="6" name="Picture 5">
+            <a:extLst>
+              <a:ext uri="{FF2B5EF4-FFF2-40B4-BE49-F238E27FC236}">
+                <a16:creationId xmlns:a16="http://schemas.microsoft.com/office/drawing/2014/main" id="{79951BBE-ECFF-53A4-651E-6BC3B019C466}"/>
+              </a:ext>
+            </a:extLst>
+          </p:cNvPr>
+          <p:cNvPicPr>
+            <a:picLocks noChangeAspect="1"/>
+          </p:cNvPicPr>
+          <p:nvPr/>
+        </p:nvPicPr>
+        <p:blipFill>
+          <a:blip r:embed="rId3"/>
+          <a:stretch>
+            <a:fillRect/>
+          </a:stretch>
+        </p:blipFill>
+        <p:spPr>
+          <a:xfrm>
+            <a:off x="7020339" y="168396"/>
+            <a:ext cx="5171661" cy="3878746"/>
+          </a:xfrm>
+          <a:prstGeom prst="rect">
+            <a:avLst/>
+          </a:prstGeom>
+        </p:spPr>
+      </p:pic>
+      <p:pic>
+        <p:nvPicPr>
+          <p:cNvPr id="9" name="Picture 8">
+            <a:extLst>
+              <a:ext uri="{FF2B5EF4-FFF2-40B4-BE49-F238E27FC236}">
+                <a16:creationId xmlns:a16="http://schemas.microsoft.com/office/drawing/2014/main" id="{892E7851-45BF-D510-76B9-9E2739B597C4}"/>
+              </a:ext>
+            </a:extLst>
+          </p:cNvPr>
+          <p:cNvPicPr>
+            <a:picLocks noChangeAspect="1"/>
+          </p:cNvPicPr>
+          <p:nvPr/>
+        </p:nvPicPr>
+        <p:blipFill>
+          <a:blip r:embed="rId4"/>
+          <a:stretch>
+            <a:fillRect/>
+          </a:stretch>
+        </p:blipFill>
+        <p:spPr>
+          <a:xfrm>
+            <a:off x="680406" y="44809"/>
+            <a:ext cx="4623925" cy="2852140"/>
+          </a:xfrm>
+          <a:prstGeom prst="rect">
+            <a:avLst/>
+          </a:prstGeom>
+        </p:spPr>
+      </p:pic>
+    </p:spTree>
+    <p:extLst>
+      <p:ext uri="{BB962C8B-B14F-4D97-AF65-F5344CB8AC3E}">
+        <p14:creationId xmlns:p14="http://schemas.microsoft.com/office/powerpoint/2010/main" val="950761203"/>
+      </p:ext>
+    </p:extLst>
+  </p:cSld>
+  <p:clrMapOvr>
+    <a:masterClrMapping/>
+  </p:clrMapOvr>
+</p:sld>
+</file>
+
+<file path=ppt/slides/slide5.xml><?xml version="1.0" encoding="utf-8"?>
+<p:sld xmlns:a="http://schemas.openxmlformats.org/drawingml/2006/main" xmlns:r="http://schemas.openxmlformats.org/officeDocument/2006/relationships" xmlns:p="http://schemas.openxmlformats.org/presentationml/2006/main">
+  <p:cSld>
+    <p:spTree>
+      <p:nvGrpSpPr>
+        <p:cNvPr id="1" name=""/>
+        <p:cNvGrpSpPr/>
+        <p:nvPr/>
+      </p:nvGrpSpPr>
+      <p:grpSpPr>
+        <a:xfrm>
+          <a:off x="0" y="0"/>
+          <a:ext cx="0" cy="0"/>
+          <a:chOff x="0" y="0"/>
+          <a:chExt cx="0" cy="0"/>
+        </a:xfrm>
+      </p:grpSpPr>
+      <p:pic>
+        <p:nvPicPr>
+          <p:cNvPr id="2" name="Picture 1">
+            <a:extLst>
+              <a:ext uri="{FF2B5EF4-FFF2-40B4-BE49-F238E27FC236}">
+                <a16:creationId xmlns:a16="http://schemas.microsoft.com/office/drawing/2014/main" id="{78A58FF8-1189-9CEB-26A7-13240678053B}"/>
+              </a:ext>
+            </a:extLst>
+          </p:cNvPr>
+          <p:cNvPicPr>
+            <a:picLocks noChangeAspect="1"/>
+          </p:cNvPicPr>
+          <p:nvPr/>
+        </p:nvPicPr>
+        <p:blipFill>
+          <a:blip r:embed="rId2"/>
+          <a:stretch>
+            <a:fillRect/>
+          </a:stretch>
+        </p:blipFill>
+        <p:spPr>
+          <a:xfrm>
+            <a:off x="-31325" y="165593"/>
+            <a:ext cx="6861002" cy="3721220"/>
+          </a:xfrm>
+          <a:prstGeom prst="rect">
+            <a:avLst/>
+          </a:prstGeom>
+        </p:spPr>
+      </p:pic>
+      <p:pic>
+        <p:nvPicPr>
+          <p:cNvPr id="3" name="Picture 2">
+            <a:extLst>
+              <a:ext uri="{FF2B5EF4-FFF2-40B4-BE49-F238E27FC236}">
+                <a16:creationId xmlns:a16="http://schemas.microsoft.com/office/drawing/2014/main" id="{40A3A46E-9155-2EC0-3DCE-3EFF5A0D8EFE}"/>
+              </a:ext>
+            </a:extLst>
+          </p:cNvPr>
+          <p:cNvPicPr>
+            <a:picLocks noChangeAspect="1"/>
+          </p:cNvPicPr>
+          <p:nvPr/>
+        </p:nvPicPr>
+        <p:blipFill>
+          <a:blip r:embed="rId3"/>
+          <a:stretch>
+            <a:fillRect/>
+          </a:stretch>
+        </p:blipFill>
+        <p:spPr>
+          <a:xfrm>
+            <a:off x="6829677" y="80920"/>
+            <a:ext cx="5362323" cy="4021742"/>
+          </a:xfrm>
+          <a:prstGeom prst="rect">
+            <a:avLst/>
+          </a:prstGeom>
+        </p:spPr>
+      </p:pic>
+      <p:pic>
+        <p:nvPicPr>
+          <p:cNvPr id="5" name="Picture 4">
+            <a:extLst>
+              <a:ext uri="{FF2B5EF4-FFF2-40B4-BE49-F238E27FC236}">
+                <a16:creationId xmlns:a16="http://schemas.microsoft.com/office/drawing/2014/main" id="{B7FDFABA-98B0-FAD5-9F9B-78AB5AA1985C}"/>
+              </a:ext>
+            </a:extLst>
+          </p:cNvPr>
+          <p:cNvPicPr>
+            <a:picLocks noChangeAspect="1"/>
+          </p:cNvPicPr>
+          <p:nvPr/>
+        </p:nvPicPr>
+        <p:blipFill>
+          <a:blip r:embed="rId4"/>
+          <a:stretch>
+            <a:fillRect/>
+          </a:stretch>
+        </p:blipFill>
+        <p:spPr>
+          <a:xfrm>
+            <a:off x="809878" y="3971486"/>
+            <a:ext cx="3791977" cy="2361042"/>
+          </a:xfrm>
+          <a:prstGeom prst="rect">
+            <a:avLst/>
+          </a:prstGeom>
+        </p:spPr>
+      </p:pic>
+    </p:spTree>
+    <p:extLst>
+      <p:ext uri="{BB962C8B-B14F-4D97-AF65-F5344CB8AC3E}">
+        <p14:creationId xmlns:p14="http://schemas.microsoft.com/office/powerpoint/2010/main" val="2862426066"/>
+      </p:ext>
+    </p:extLst>
+  </p:cSld>
+  <p:clrMapOvr>
+    <a:masterClrMapping/>
+  </p:clrMapOvr>
+</p:sld>
+</file>
+
+<file path=ppt/slides/slide6.xml><?xml version="1.0" encoding="utf-8"?>
+<p:sld xmlns:a="http://schemas.openxmlformats.org/drawingml/2006/main" xmlns:r="http://schemas.openxmlformats.org/officeDocument/2006/relationships" xmlns:p="http://schemas.openxmlformats.org/presentationml/2006/main">
+  <p:cSld>
+    <p:spTree>
+      <p:nvGrpSpPr>
+        <p:cNvPr id="1" name=""/>
+        <p:cNvGrpSpPr/>
+        <p:nvPr/>
+      </p:nvGrpSpPr>
+      <p:grpSpPr>
+        <a:xfrm>
+          <a:off x="0" y="0"/>
+          <a:ext cx="0" cy="0"/>
+          <a:chOff x="0" y="0"/>
+          <a:chExt cx="0" cy="0"/>
+        </a:xfrm>
+      </p:grpSpPr>
+      <mc:AlternateContent xmlns:mc="http://schemas.openxmlformats.org/markup-compatibility/2006">
+        <mc:Choice xmlns:a14="http://schemas.microsoft.com/office/drawing/2010/main" Requires="a14">
+          <p:sp>
+            <p:nvSpPr>
+              <p:cNvPr id="2" name="TextBox 1">
+                <a:extLst>
+                  <a:ext uri="{FF2B5EF4-FFF2-40B4-BE49-F238E27FC236}">
+                    <a16:creationId xmlns:a16="http://schemas.microsoft.com/office/drawing/2014/main" id="{C3F4689B-2DBA-A79A-CFCD-9D9892FE6D4F}"/>
+                  </a:ext>
+                </a:extLst>
+              </p:cNvPr>
+              <p:cNvSpPr txBox="1"/>
+              <p:nvPr/>
+            </p:nvSpPr>
+            <p:spPr>
+              <a:xfrm>
+                <a:off x="326572" y="108857"/>
+                <a:ext cx="11364686" cy="2862322"/>
+              </a:xfrm>
+              <a:prstGeom prst="rect">
+                <a:avLst/>
+              </a:prstGeom>
+              <a:noFill/>
+            </p:spPr>
+            <p:txBody>
+              <a:bodyPr wrap="square" rtlCol="0">
+                <a:spAutoFit/>
+              </a:bodyPr>
+              <a:lstStyle/>
+              <a:p>
+                <a:r>
+                  <a:rPr lang="en-US" dirty="0"/>
+                  <a:t>The retrieval can replicate the frequency marginal very well: the limited bandwidth is in fact an experimental limitation. This can be verified by calculating the FROG for a transform limited pulse using the measured spectrum. You can add whatever chirp to it, but the numerical FROG’s spectral bandwidth is always wider than the experimental one.</a:t>
+                </a:r>
+              </a:p>
+              <a:p>
+                <a:endParaRPr lang="en-US" dirty="0"/>
+              </a:p>
+              <a:p>
+                <a:r>
+                  <a:rPr lang="en-US" dirty="0"/>
+                  <a:t>I think this is very likely due to trying to focus a “geometrically blurred” SFG wave into the 25 um slit of the grating spectrometer. Doing so uniformly is very difficult. Typically, we have positioned the grating’s slit onto the beam such that the </a:t>
+                </a:r>
+                <a14:m>
+                  <m:oMath xmlns:m="http://schemas.openxmlformats.org/officeDocument/2006/math">
+                    <m:sSub>
+                      <m:sSubPr>
+                        <m:ctrlPr>
+                          <a:rPr lang="en-US" b="0" i="1" smtClean="0">
+                            <a:latin typeface="Cambria Math" panose="02040503050406030204" pitchFamily="18" charset="0"/>
+                          </a:rPr>
+                        </m:ctrlPr>
+                      </m:sSubPr>
+                      <m:e>
+                        <m:r>
+                          <a:rPr lang="en-US" b="0" i="1" smtClean="0">
+                            <a:latin typeface="Cambria Math" panose="02040503050406030204" pitchFamily="18" charset="0"/>
+                          </a:rPr>
+                          <m:t>𝑡</m:t>
+                        </m:r>
+                      </m:e>
+                      <m:sub>
+                        <m:r>
+                          <a:rPr lang="en-US" b="0" i="1" smtClean="0">
+                            <a:latin typeface="Cambria Math" panose="02040503050406030204" pitchFamily="18" charset="0"/>
+                          </a:rPr>
+                          <m:t>0</m:t>
+                        </m:r>
+                      </m:sub>
+                    </m:sSub>
+                  </m:oMath>
+                </a14:m>
+                <a:r>
+                  <a:rPr lang="en-US" dirty="0"/>
+                  <a:t> light is maximized, and the spectrogram is symmetric. This is the best we can do for now.</a:t>
+                </a:r>
+              </a:p>
+              <a:p>
+                <a:endParaRPr lang="en-US" dirty="0"/>
+              </a:p>
+              <a:p>
+                <a:r>
+                  <a:rPr lang="en-US" dirty="0"/>
+                  <a:t>We can buy/try to trade for a spectrometer with a larger slit and lower wavelength resolution. However, at 1550 nm, we should also consider doing collinear FROG, where the required sampling interval is actually something we already use!</a:t>
+                </a:r>
+              </a:p>
+            </p:txBody>
+          </p:sp>
+        </mc:Choice>
+        <mc:Fallback>
+          <p:sp>
+            <p:nvSpPr>
+              <p:cNvPr id="2" name="TextBox 1">
+                <a:extLst>
+                  <a:ext uri="{FF2B5EF4-FFF2-40B4-BE49-F238E27FC236}">
+                    <a16:creationId xmlns:a16="http://schemas.microsoft.com/office/drawing/2014/main" id="{C3F4689B-2DBA-A79A-CFCD-9D9892FE6D4F}"/>
+                  </a:ext>
+                </a:extLst>
+              </p:cNvPr>
+              <p:cNvSpPr txBox="1">
+                <a:spLocks noRot="1" noChangeAspect="1" noMove="1" noResize="1" noEditPoints="1" noAdjustHandles="1" noChangeArrowheads="1" noChangeShapeType="1" noTextEdit="1"/>
+              </p:cNvSpPr>
+              <p:nvPr/>
+            </p:nvSpPr>
+            <p:spPr>
+              <a:xfrm>
+                <a:off x="326572" y="108857"/>
+                <a:ext cx="11364686" cy="2862322"/>
+              </a:xfrm>
+              <a:prstGeom prst="rect">
+                <a:avLst/>
+              </a:prstGeom>
+              <a:blipFill>
+                <a:blip r:embed="rId2"/>
+                <a:stretch>
+                  <a:fillRect l="-446" t="-885" r="-446" b="-2655"/>
+                </a:stretch>
+              </a:blipFill>
+            </p:spPr>
+            <p:txBody>
+              <a:bodyPr/>
+              <a:lstStyle/>
+              <a:p>
+                <a:r>
+                  <a:rPr lang="en-US">
+                    <a:noFill/>
+                  </a:rPr>
+                  <a:t> </a:t>
+                </a:r>
+              </a:p>
+            </p:txBody>
+          </p:sp>
+        </mc:Fallback>
+      </mc:AlternateContent>
+    </p:spTree>
+    <p:extLst>
+      <p:ext uri="{BB962C8B-B14F-4D97-AF65-F5344CB8AC3E}">
+        <p14:creationId xmlns:p14="http://schemas.microsoft.com/office/powerpoint/2010/main" val="4287811359"/>
+      </p:ext>
+    </p:extLst>
+  </p:cSld>
+  <p:clrMapOvr>
+    <a:masterClrMapping/>
+  </p:clrMapOvr>
+</p:sld>
+</file>
+
+<file path=ppt/slides/slide7.xml><?xml version="1.0" encoding="utf-8"?>
+<p:sld xmlns:a="http://schemas.openxmlformats.org/drawingml/2006/main" xmlns:r="http://schemas.openxmlformats.org/officeDocument/2006/relationships" xmlns:p="http://schemas.openxmlformats.org/presentationml/2006/main">
+  <p:cSld>
+    <p:spTree>
+      <p:nvGrpSpPr>
+        <p:cNvPr id="1" name=""/>
+        <p:cNvGrpSpPr/>
+        <p:nvPr/>
+      </p:nvGrpSpPr>
+      <p:grpSpPr>
+        <a:xfrm>
+          <a:off x="0" y="0"/>
+          <a:ext cx="0" cy="0"/>
+          <a:chOff x="0" y="0"/>
+          <a:chExt cx="0" cy="0"/>
+        </a:xfrm>
+      </p:grpSpPr>
+      <p:pic>
+        <p:nvPicPr>
+          <p:cNvPr id="3" name="Picture 2">
+            <a:extLst>
+              <a:ext uri="{FF2B5EF4-FFF2-40B4-BE49-F238E27FC236}">
+                <a16:creationId xmlns:a16="http://schemas.microsoft.com/office/drawing/2014/main" id="{73FF30BE-0514-30D7-40A5-C81DB77146C8}"/>
+              </a:ext>
+            </a:extLst>
+          </p:cNvPr>
+          <p:cNvPicPr>
+            <a:picLocks noChangeAspect="1"/>
+          </p:cNvPicPr>
+          <p:nvPr/>
+        </p:nvPicPr>
+        <p:blipFill>
+          <a:blip r:embed="rId2"/>
+          <a:stretch>
+            <a:fillRect/>
+          </a:stretch>
+        </p:blipFill>
+        <p:spPr>
+          <a:xfrm>
+            <a:off x="544285" y="880961"/>
+            <a:ext cx="11103429" cy="4086677"/>
+          </a:xfrm>
+          <a:prstGeom prst="rect">
+            <a:avLst/>
+          </a:prstGeom>
+        </p:spPr>
+      </p:pic>
+      <p:sp>
+        <p:nvSpPr>
+          <p:cNvPr id="5" name="TextBox 4">
+            <a:extLst>
+              <a:ext uri="{FF2B5EF4-FFF2-40B4-BE49-F238E27FC236}">
+                <a16:creationId xmlns:a16="http://schemas.microsoft.com/office/drawing/2014/main" id="{989D7823-9D9A-AD54-3E96-CC28F436B8E0}"/>
+              </a:ext>
+            </a:extLst>
+          </p:cNvPr>
+          <p:cNvSpPr txBox="1"/>
+          <p:nvPr/>
+        </p:nvSpPr>
+        <p:spPr>
+          <a:xfrm>
+            <a:off x="838200" y="511629"/>
+            <a:ext cx="6733382" cy="369332"/>
+          </a:xfrm>
+          <a:prstGeom prst="rect">
+            <a:avLst/>
+          </a:prstGeom>
+          <a:noFill/>
+        </p:spPr>
+        <p:txBody>
+          <a:bodyPr wrap="none" rtlCol="0">
+            <a:spAutoFit/>
+          </a:bodyPr>
+          <a:lstStyle/>
+          <a:p>
+            <a:r>
+              <a:rPr lang="en-US" dirty="0"/>
+              <a:t>The calculated collinear FROG based off the retrieval of Garrett’s pulse</a:t>
+            </a:r>
+          </a:p>
+        </p:txBody>
+      </p:sp>
+      <mc:AlternateContent xmlns:mc="http://schemas.openxmlformats.org/markup-compatibility/2006">
+        <mc:Choice xmlns:a14="http://schemas.microsoft.com/office/drawing/2010/main" Requires="a14">
+          <p:sp>
+            <p:nvSpPr>
+              <p:cNvPr id="6" name="TextBox 5">
+                <a:extLst>
+                  <a:ext uri="{FF2B5EF4-FFF2-40B4-BE49-F238E27FC236}">
+                    <a16:creationId xmlns:a16="http://schemas.microsoft.com/office/drawing/2014/main" id="{AFA22034-CF4F-AE0B-9027-5150D0922DB7}"/>
+                  </a:ext>
+                </a:extLst>
+              </p:cNvPr>
+              <p:cNvSpPr txBox="1"/>
+              <p:nvPr/>
+            </p:nvSpPr>
+            <p:spPr>
+              <a:xfrm>
+                <a:off x="446314" y="5192485"/>
+                <a:ext cx="11201400" cy="646331"/>
+              </a:xfrm>
+              <a:prstGeom prst="rect">
+                <a:avLst/>
+              </a:prstGeom>
+              <a:noFill/>
+            </p:spPr>
+            <p:txBody>
+              <a:bodyPr wrap="square" rtlCol="0">
+                <a:spAutoFit/>
+              </a:bodyPr>
+              <a:lstStyle/>
+              <a:p>
+                <a14:m>
+                  <m:oMath xmlns:m="http://schemas.openxmlformats.org/officeDocument/2006/math">
+                    <m:r>
+                      <a:rPr lang="en-US" b="0" i="1" smtClean="0">
+                        <a:latin typeface="Cambria Math" panose="02040503050406030204" pitchFamily="18" charset="0"/>
+                      </a:rPr>
+                      <m:t>~4−5</m:t>
+                    </m:r>
+                  </m:oMath>
+                </a14:m>
+                <a:r>
+                  <a:rPr lang="en-US" dirty="0"/>
+                  <a:t> fs sampling can resolve the fringes well enough that we can implement a low pass filter in the Fourier domain to recover the non-collinear FROG. </a:t>
+                </a:r>
+              </a:p>
+            </p:txBody>
+          </p:sp>
+        </mc:Choice>
+        <mc:Fallback>
+          <p:sp>
+            <p:nvSpPr>
+              <p:cNvPr id="6" name="TextBox 5">
+                <a:extLst>
+                  <a:ext uri="{FF2B5EF4-FFF2-40B4-BE49-F238E27FC236}">
+                    <a16:creationId xmlns:a16="http://schemas.microsoft.com/office/drawing/2014/main" id="{AFA22034-CF4F-AE0B-9027-5150D0922DB7}"/>
+                  </a:ext>
+                </a:extLst>
+              </p:cNvPr>
+              <p:cNvSpPr txBox="1">
+                <a:spLocks noRot="1" noChangeAspect="1" noMove="1" noResize="1" noEditPoints="1" noAdjustHandles="1" noChangeArrowheads="1" noChangeShapeType="1" noTextEdit="1"/>
+              </p:cNvSpPr>
+              <p:nvPr/>
+            </p:nvSpPr>
+            <p:spPr>
+              <a:xfrm>
+                <a:off x="446314" y="5192485"/>
+                <a:ext cx="11201400" cy="646331"/>
+              </a:xfrm>
+              <a:prstGeom prst="rect">
+                <a:avLst/>
+              </a:prstGeom>
+              <a:blipFill>
+                <a:blip r:embed="rId3"/>
+                <a:stretch>
+                  <a:fillRect l="-453" t="-3846" b="-13462"/>
+                </a:stretch>
+              </a:blipFill>
+            </p:spPr>
+            <p:txBody>
+              <a:bodyPr/>
+              <a:lstStyle/>
+              <a:p>
+                <a:r>
+                  <a:rPr lang="en-US">
+                    <a:noFill/>
+                  </a:rPr>
+                  <a:t> </a:t>
+                </a:r>
+              </a:p>
+            </p:txBody>
+          </p:sp>
+        </mc:Fallback>
+      </mc:AlternateContent>
+    </p:spTree>
+    <p:extLst>
+      <p:ext uri="{BB962C8B-B14F-4D97-AF65-F5344CB8AC3E}">
+        <p14:creationId xmlns:p14="http://schemas.microsoft.com/office/powerpoint/2010/main" val="1031353496"/>
       </p:ext>
     </p:extLst>
   </p:cSld>

</xml_diff>